<commit_message>
Added nuke power up.
</commit_message>
<xml_diff>
--- a/assets/Icons/icons.pptx
+++ b/assets/Icons/icons.pptx
@@ -106,6 +106,11 @@
       </a:defRPr>
     </a:lvl9pPr>
   </p:defaultTextStyle>
+  <p:extLst>
+    <p:ext uri="{EFAFB233-063F-42B5-8137-9DF3F51BA10A}">
+      <p15:sldGuideLst xmlns:p15="http://schemas.microsoft.com/office/powerpoint/2012/main"/>
+    </p:ext>
+  </p:extLst>
 </p:presentation>
 </file>
 
@@ -258,7 +263,7 @@
           <a:p>
             <a:fld id="{83B0DD9A-6AEE-4CA7-A9F6-A1A12CF444F7}" type="datetimeFigureOut">
               <a:rPr lang="en-AU" smtClean="0"/>
-              <a:t>25/12/2021</a:t>
+              <a:t>6/01/2022</a:t>
             </a:fld>
             <a:endParaRPr lang="en-AU"/>
           </a:p>
@@ -458,7 +463,7 @@
           <a:p>
             <a:fld id="{83B0DD9A-6AEE-4CA7-A9F6-A1A12CF444F7}" type="datetimeFigureOut">
               <a:rPr lang="en-AU" smtClean="0"/>
-              <a:t>25/12/2021</a:t>
+              <a:t>6/01/2022</a:t>
             </a:fld>
             <a:endParaRPr lang="en-AU"/>
           </a:p>
@@ -668,7 +673,7 @@
           <a:p>
             <a:fld id="{83B0DD9A-6AEE-4CA7-A9F6-A1A12CF444F7}" type="datetimeFigureOut">
               <a:rPr lang="en-AU" smtClean="0"/>
-              <a:t>25/12/2021</a:t>
+              <a:t>6/01/2022</a:t>
             </a:fld>
             <a:endParaRPr lang="en-AU"/>
           </a:p>
@@ -868,7 +873,7 @@
           <a:p>
             <a:fld id="{83B0DD9A-6AEE-4CA7-A9F6-A1A12CF444F7}" type="datetimeFigureOut">
               <a:rPr lang="en-AU" smtClean="0"/>
-              <a:t>25/12/2021</a:t>
+              <a:t>6/01/2022</a:t>
             </a:fld>
             <a:endParaRPr lang="en-AU"/>
           </a:p>
@@ -1144,7 +1149,7 @@
           <a:p>
             <a:fld id="{83B0DD9A-6AEE-4CA7-A9F6-A1A12CF444F7}" type="datetimeFigureOut">
               <a:rPr lang="en-AU" smtClean="0"/>
-              <a:t>25/12/2021</a:t>
+              <a:t>6/01/2022</a:t>
             </a:fld>
             <a:endParaRPr lang="en-AU"/>
           </a:p>
@@ -1412,7 +1417,7 @@
           <a:p>
             <a:fld id="{83B0DD9A-6AEE-4CA7-A9F6-A1A12CF444F7}" type="datetimeFigureOut">
               <a:rPr lang="en-AU" smtClean="0"/>
-              <a:t>25/12/2021</a:t>
+              <a:t>6/01/2022</a:t>
             </a:fld>
             <a:endParaRPr lang="en-AU"/>
           </a:p>
@@ -1827,7 +1832,7 @@
           <a:p>
             <a:fld id="{83B0DD9A-6AEE-4CA7-A9F6-A1A12CF444F7}" type="datetimeFigureOut">
               <a:rPr lang="en-AU" smtClean="0"/>
-              <a:t>25/12/2021</a:t>
+              <a:t>6/01/2022</a:t>
             </a:fld>
             <a:endParaRPr lang="en-AU"/>
           </a:p>
@@ -1969,7 +1974,7 @@
           <a:p>
             <a:fld id="{83B0DD9A-6AEE-4CA7-A9F6-A1A12CF444F7}" type="datetimeFigureOut">
               <a:rPr lang="en-AU" smtClean="0"/>
-              <a:t>25/12/2021</a:t>
+              <a:t>6/01/2022</a:t>
             </a:fld>
             <a:endParaRPr lang="en-AU"/>
           </a:p>
@@ -2082,7 +2087,7 @@
           <a:p>
             <a:fld id="{83B0DD9A-6AEE-4CA7-A9F6-A1A12CF444F7}" type="datetimeFigureOut">
               <a:rPr lang="en-AU" smtClean="0"/>
-              <a:t>25/12/2021</a:t>
+              <a:t>6/01/2022</a:t>
             </a:fld>
             <a:endParaRPr lang="en-AU"/>
           </a:p>
@@ -2395,7 +2400,7 @@
           <a:p>
             <a:fld id="{83B0DD9A-6AEE-4CA7-A9F6-A1A12CF444F7}" type="datetimeFigureOut">
               <a:rPr lang="en-AU" smtClean="0"/>
-              <a:t>25/12/2021</a:t>
+              <a:t>6/01/2022</a:t>
             </a:fld>
             <a:endParaRPr lang="en-AU"/>
           </a:p>
@@ -2684,7 +2689,7 @@
           <a:p>
             <a:fld id="{83B0DD9A-6AEE-4CA7-A9F6-A1A12CF444F7}" type="datetimeFigureOut">
               <a:rPr lang="en-AU" smtClean="0"/>
-              <a:t>25/12/2021</a:t>
+              <a:t>6/01/2022</a:t>
             </a:fld>
             <a:endParaRPr lang="en-AU"/>
           </a:p>
@@ -2927,7 +2932,7 @@
           <a:p>
             <a:fld id="{83B0DD9A-6AEE-4CA7-A9F6-A1A12CF444F7}" type="datetimeFigureOut">
               <a:rPr lang="en-AU" smtClean="0"/>
-              <a:t>25/12/2021</a:t>
+              <a:t>6/01/2022</a:t>
             </a:fld>
             <a:endParaRPr lang="en-AU"/>
           </a:p>

</xml_diff>

<commit_message>
Fixed multiple explosions from missiles/rockets/lava. Added flickering headlights when car damaged. Added start time via GUI for day/night cycle.
</commit_message>
<xml_diff>
--- a/assets/Icons/icons.pptx
+++ b/assets/Icons/icons.pptx
@@ -8,6 +8,7 @@
     <p:sldId id="256" r:id="rId2"/>
     <p:sldId id="257" r:id="rId3"/>
     <p:sldId id="258" r:id="rId4"/>
+    <p:sldId id="259" r:id="rId5"/>
   </p:sldIdLst>
   <p:sldSz cx="12192000" cy="6858000"/>
   <p:notesSz cx="6858000" cy="9144000"/>
@@ -263,7 +264,7 @@
           <a:p>
             <a:fld id="{83B0DD9A-6AEE-4CA7-A9F6-A1A12CF444F7}" type="datetimeFigureOut">
               <a:rPr lang="en-AU" smtClean="0"/>
-              <a:t>6/01/2022</a:t>
+              <a:t>9/01/2022</a:t>
             </a:fld>
             <a:endParaRPr lang="en-AU"/>
           </a:p>
@@ -463,7 +464,7 @@
           <a:p>
             <a:fld id="{83B0DD9A-6AEE-4CA7-A9F6-A1A12CF444F7}" type="datetimeFigureOut">
               <a:rPr lang="en-AU" smtClean="0"/>
-              <a:t>6/01/2022</a:t>
+              <a:t>9/01/2022</a:t>
             </a:fld>
             <a:endParaRPr lang="en-AU"/>
           </a:p>
@@ -673,7 +674,7 @@
           <a:p>
             <a:fld id="{83B0DD9A-6AEE-4CA7-A9F6-A1A12CF444F7}" type="datetimeFigureOut">
               <a:rPr lang="en-AU" smtClean="0"/>
-              <a:t>6/01/2022</a:t>
+              <a:t>9/01/2022</a:t>
             </a:fld>
             <a:endParaRPr lang="en-AU"/>
           </a:p>
@@ -873,7 +874,7 @@
           <a:p>
             <a:fld id="{83B0DD9A-6AEE-4CA7-A9F6-A1A12CF444F7}" type="datetimeFigureOut">
               <a:rPr lang="en-AU" smtClean="0"/>
-              <a:t>6/01/2022</a:t>
+              <a:t>9/01/2022</a:t>
             </a:fld>
             <a:endParaRPr lang="en-AU"/>
           </a:p>
@@ -1149,7 +1150,7 @@
           <a:p>
             <a:fld id="{83B0DD9A-6AEE-4CA7-A9F6-A1A12CF444F7}" type="datetimeFigureOut">
               <a:rPr lang="en-AU" smtClean="0"/>
-              <a:t>6/01/2022</a:t>
+              <a:t>9/01/2022</a:t>
             </a:fld>
             <a:endParaRPr lang="en-AU"/>
           </a:p>
@@ -1417,7 +1418,7 @@
           <a:p>
             <a:fld id="{83B0DD9A-6AEE-4CA7-A9F6-A1A12CF444F7}" type="datetimeFigureOut">
               <a:rPr lang="en-AU" smtClean="0"/>
-              <a:t>6/01/2022</a:t>
+              <a:t>9/01/2022</a:t>
             </a:fld>
             <a:endParaRPr lang="en-AU"/>
           </a:p>
@@ -1832,7 +1833,7 @@
           <a:p>
             <a:fld id="{83B0DD9A-6AEE-4CA7-A9F6-A1A12CF444F7}" type="datetimeFigureOut">
               <a:rPr lang="en-AU" smtClean="0"/>
-              <a:t>6/01/2022</a:t>
+              <a:t>9/01/2022</a:t>
             </a:fld>
             <a:endParaRPr lang="en-AU"/>
           </a:p>
@@ -1974,7 +1975,7 @@
           <a:p>
             <a:fld id="{83B0DD9A-6AEE-4CA7-A9F6-A1A12CF444F7}" type="datetimeFigureOut">
               <a:rPr lang="en-AU" smtClean="0"/>
-              <a:t>6/01/2022</a:t>
+              <a:t>9/01/2022</a:t>
             </a:fld>
             <a:endParaRPr lang="en-AU"/>
           </a:p>
@@ -2087,7 +2088,7 @@
           <a:p>
             <a:fld id="{83B0DD9A-6AEE-4CA7-A9F6-A1A12CF444F7}" type="datetimeFigureOut">
               <a:rPr lang="en-AU" smtClean="0"/>
-              <a:t>6/01/2022</a:t>
+              <a:t>9/01/2022</a:t>
             </a:fld>
             <a:endParaRPr lang="en-AU"/>
           </a:p>
@@ -2400,7 +2401,7 @@
           <a:p>
             <a:fld id="{83B0DD9A-6AEE-4CA7-A9F6-A1A12CF444F7}" type="datetimeFigureOut">
               <a:rPr lang="en-AU" smtClean="0"/>
-              <a:t>6/01/2022</a:t>
+              <a:t>9/01/2022</a:t>
             </a:fld>
             <a:endParaRPr lang="en-AU"/>
           </a:p>
@@ -2689,7 +2690,7 @@
           <a:p>
             <a:fld id="{83B0DD9A-6AEE-4CA7-A9F6-A1A12CF444F7}" type="datetimeFigureOut">
               <a:rPr lang="en-AU" smtClean="0"/>
-              <a:t>6/01/2022</a:t>
+              <a:t>9/01/2022</a:t>
             </a:fld>
             <a:endParaRPr lang="en-AU"/>
           </a:p>
@@ -2932,7 +2933,7 @@
           <a:p>
             <a:fld id="{83B0DD9A-6AEE-4CA7-A9F6-A1A12CF444F7}" type="datetimeFigureOut">
               <a:rPr lang="en-AU" smtClean="0"/>
-              <a:t>6/01/2022</a:t>
+              <a:t>9/01/2022</a:t>
             </a:fld>
             <a:endParaRPr lang="en-AU"/>
           </a:p>
@@ -3349,218 +3350,239 @@
           <a:chExt cx="0" cy="0"/>
         </a:xfrm>
       </p:grpSpPr>
-      <p:sp>
-        <p:nvSpPr>
-          <p:cNvPr id="4" name="Rectangle 3">
-            <a:extLst>
-              <a:ext uri="{FF2B5EF4-FFF2-40B4-BE49-F238E27FC236}">
-                <a16:creationId xmlns:a16="http://schemas.microsoft.com/office/drawing/2014/main" id="{ED4C6AF5-E0CD-4909-A091-D24C7B5ADFEC}"/>
-              </a:ext>
-            </a:extLst>
-          </p:cNvPr>
-          <p:cNvSpPr/>
+      <p:grpSp>
+        <p:nvGrpSpPr>
+          <p:cNvPr id="2" name="Group 1">
+            <a:extLst>
+              <a:ext uri="{FF2B5EF4-FFF2-40B4-BE49-F238E27FC236}">
+                <a16:creationId xmlns:a16="http://schemas.microsoft.com/office/drawing/2014/main" id="{783DE72E-87FD-4D11-9109-A1401849E685}"/>
+              </a:ext>
+            </a:extLst>
+          </p:cNvPr>
+          <p:cNvGrpSpPr/>
           <p:nvPr/>
-        </p:nvSpPr>
-        <p:spPr>
+        </p:nvGrpSpPr>
+        <p:grpSpPr>
           <a:xfrm>
-            <a:off x="1354668" y="2230967"/>
-            <a:ext cx="7662332" cy="2396067"/>
+            <a:off x="1354668" y="131232"/>
+            <a:ext cx="10185398" cy="6595535"/>
+            <a:chOff x="1354668" y="131232"/>
+            <a:chExt cx="10185398" cy="6595535"/>
           </a:xfrm>
-          <a:prstGeom prst="rect">
-            <a:avLst/>
-          </a:prstGeom>
-          <a:solidFill>
-            <a:schemeClr val="tx1"/>
-          </a:solidFill>
-          <a:ln>
-            <a:noFill/>
-          </a:ln>
-        </p:spPr>
-        <p:style>
-          <a:lnRef idx="2">
-            <a:schemeClr val="accent1">
-              <a:shade val="50000"/>
-            </a:schemeClr>
-          </a:lnRef>
-          <a:fillRef idx="1">
-            <a:schemeClr val="accent1"/>
-          </a:fillRef>
-          <a:effectRef idx="0">
-            <a:schemeClr val="accent1"/>
-          </a:effectRef>
-          <a:fontRef idx="minor">
-            <a:schemeClr val="lt1"/>
-          </a:fontRef>
-        </p:style>
-        <p:txBody>
-          <a:bodyPr rtlCol="0" anchor="ctr"/>
-          <a:lstStyle/>
-          <a:p>
-            <a:pPr algn="ctr"/>
-            <a:endParaRPr lang="en-AU"/>
-          </a:p>
-        </p:txBody>
-      </p:sp>
-      <p:sp>
-        <p:nvSpPr>
-          <p:cNvPr id="5" name="Isosceles Triangle 4">
-            <a:extLst>
-              <a:ext uri="{FF2B5EF4-FFF2-40B4-BE49-F238E27FC236}">
-                <a16:creationId xmlns:a16="http://schemas.microsoft.com/office/drawing/2014/main" id="{6DBC495A-5066-41BB-9D6B-19616BA35479}"/>
-              </a:ext>
-            </a:extLst>
-          </p:cNvPr>
-          <p:cNvSpPr/>
-          <p:nvPr/>
-        </p:nvSpPr>
-        <p:spPr>
-          <a:xfrm rot="5400000">
-            <a:off x="9292166" y="2379134"/>
-            <a:ext cx="2396067" cy="2099733"/>
-          </a:xfrm>
-          <a:prstGeom prst="triangle">
-            <a:avLst/>
-          </a:prstGeom>
-          <a:solidFill>
-            <a:schemeClr val="tx1"/>
-          </a:solidFill>
-          <a:ln>
-            <a:noFill/>
-          </a:ln>
-        </p:spPr>
-        <p:style>
-          <a:lnRef idx="2">
-            <a:schemeClr val="accent1">
-              <a:shade val="50000"/>
-            </a:schemeClr>
-          </a:lnRef>
-          <a:fillRef idx="1">
-            <a:schemeClr val="accent1"/>
-          </a:fillRef>
-          <a:effectRef idx="0">
-            <a:schemeClr val="accent1"/>
-          </a:effectRef>
-          <a:fontRef idx="minor">
-            <a:schemeClr val="lt1"/>
-          </a:fontRef>
-        </p:style>
-        <p:txBody>
-          <a:bodyPr rtlCol="0" anchor="ctr"/>
-          <a:lstStyle/>
-          <a:p>
-            <a:pPr algn="ctr"/>
-            <a:endParaRPr lang="en-AU"/>
-          </a:p>
-        </p:txBody>
-      </p:sp>
-      <p:sp>
-        <p:nvSpPr>
-          <p:cNvPr id="6" name="Isosceles Triangle 5">
-            <a:extLst>
-              <a:ext uri="{FF2B5EF4-FFF2-40B4-BE49-F238E27FC236}">
-                <a16:creationId xmlns:a16="http://schemas.microsoft.com/office/drawing/2014/main" id="{50049509-024F-43EA-A614-2C31B6803B8F}"/>
-              </a:ext>
-            </a:extLst>
-          </p:cNvPr>
-          <p:cNvSpPr/>
-          <p:nvPr/>
-        </p:nvSpPr>
-        <p:spPr>
-          <a:xfrm>
-            <a:off x="2616200" y="131234"/>
-            <a:ext cx="2396067" cy="2099733"/>
-          </a:xfrm>
-          <a:prstGeom prst="triangle">
-            <a:avLst>
-              <a:gd name="adj" fmla="val 0"/>
-            </a:avLst>
-          </a:prstGeom>
-          <a:solidFill>
-            <a:schemeClr val="tx1"/>
-          </a:solidFill>
-          <a:ln>
-            <a:noFill/>
-          </a:ln>
-        </p:spPr>
-        <p:style>
-          <a:lnRef idx="2">
-            <a:schemeClr val="accent1">
-              <a:shade val="50000"/>
-            </a:schemeClr>
-          </a:lnRef>
-          <a:fillRef idx="1">
-            <a:schemeClr val="accent1"/>
-          </a:fillRef>
-          <a:effectRef idx="0">
-            <a:schemeClr val="accent1"/>
-          </a:effectRef>
-          <a:fontRef idx="minor">
-            <a:schemeClr val="lt1"/>
-          </a:fontRef>
-        </p:style>
-        <p:txBody>
-          <a:bodyPr rtlCol="0" anchor="ctr"/>
-          <a:lstStyle/>
-          <a:p>
-            <a:pPr algn="ctr"/>
-            <a:endParaRPr lang="en-AU"/>
-          </a:p>
-        </p:txBody>
-      </p:sp>
-      <p:sp>
-        <p:nvSpPr>
-          <p:cNvPr id="7" name="Isosceles Triangle 6">
-            <a:extLst>
-              <a:ext uri="{FF2B5EF4-FFF2-40B4-BE49-F238E27FC236}">
-                <a16:creationId xmlns:a16="http://schemas.microsoft.com/office/drawing/2014/main" id="{09592E3D-F6C0-461B-8709-73F823E65EF4}"/>
-              </a:ext>
-            </a:extLst>
-          </p:cNvPr>
-          <p:cNvSpPr/>
-          <p:nvPr/>
-        </p:nvSpPr>
-        <p:spPr>
-          <a:xfrm rot="10800000">
-            <a:off x="2616200" y="4627034"/>
-            <a:ext cx="2396067" cy="2099733"/>
-          </a:xfrm>
-          <a:prstGeom prst="triangle">
-            <a:avLst>
-              <a:gd name="adj" fmla="val 100000"/>
-            </a:avLst>
-          </a:prstGeom>
-          <a:solidFill>
-            <a:schemeClr val="tx1"/>
-          </a:solidFill>
-          <a:ln>
-            <a:noFill/>
-          </a:ln>
-        </p:spPr>
-        <p:style>
-          <a:lnRef idx="2">
-            <a:schemeClr val="accent1">
-              <a:shade val="50000"/>
-            </a:schemeClr>
-          </a:lnRef>
-          <a:fillRef idx="1">
-            <a:schemeClr val="accent1"/>
-          </a:fillRef>
-          <a:effectRef idx="0">
-            <a:schemeClr val="accent1"/>
-          </a:effectRef>
-          <a:fontRef idx="minor">
-            <a:schemeClr val="lt1"/>
-          </a:fontRef>
-        </p:style>
-        <p:txBody>
-          <a:bodyPr rtlCol="0" anchor="ctr"/>
-          <a:lstStyle/>
-          <a:p>
-            <a:pPr algn="ctr"/>
-            <a:endParaRPr lang="en-AU"/>
-          </a:p>
-        </p:txBody>
-      </p:sp>
+        </p:grpSpPr>
+        <p:sp>
+          <p:nvSpPr>
+            <p:cNvPr id="4" name="Rectangle 3">
+              <a:extLst>
+                <a:ext uri="{FF2B5EF4-FFF2-40B4-BE49-F238E27FC236}">
+                  <a16:creationId xmlns:a16="http://schemas.microsoft.com/office/drawing/2014/main" id="{ED4C6AF5-E0CD-4909-A091-D24C7B5ADFEC}"/>
+                </a:ext>
+              </a:extLst>
+            </p:cNvPr>
+            <p:cNvSpPr/>
+            <p:nvPr/>
+          </p:nvSpPr>
+          <p:spPr>
+            <a:xfrm>
+              <a:off x="1354668" y="2230967"/>
+              <a:ext cx="7662332" cy="2396067"/>
+            </a:xfrm>
+            <a:prstGeom prst="rect">
+              <a:avLst/>
+            </a:prstGeom>
+            <a:solidFill>
+              <a:schemeClr val="tx1"/>
+            </a:solidFill>
+            <a:ln>
+              <a:noFill/>
+            </a:ln>
+          </p:spPr>
+          <p:style>
+            <a:lnRef idx="2">
+              <a:schemeClr val="accent1">
+                <a:shade val="50000"/>
+              </a:schemeClr>
+            </a:lnRef>
+            <a:fillRef idx="1">
+              <a:schemeClr val="accent1"/>
+            </a:fillRef>
+            <a:effectRef idx="0">
+              <a:schemeClr val="accent1"/>
+            </a:effectRef>
+            <a:fontRef idx="minor">
+              <a:schemeClr val="lt1"/>
+            </a:fontRef>
+          </p:style>
+          <p:txBody>
+            <a:bodyPr rtlCol="0" anchor="ctr"/>
+            <a:lstStyle/>
+            <a:p>
+              <a:pPr algn="ctr"/>
+              <a:endParaRPr lang="en-AU"/>
+            </a:p>
+          </p:txBody>
+        </p:sp>
+        <p:sp>
+          <p:nvSpPr>
+            <p:cNvPr id="5" name="Isosceles Triangle 4">
+              <a:extLst>
+                <a:ext uri="{FF2B5EF4-FFF2-40B4-BE49-F238E27FC236}">
+                  <a16:creationId xmlns:a16="http://schemas.microsoft.com/office/drawing/2014/main" id="{6DBC495A-5066-41BB-9D6B-19616BA35479}"/>
+                </a:ext>
+              </a:extLst>
+            </p:cNvPr>
+            <p:cNvSpPr/>
+            <p:nvPr/>
+          </p:nvSpPr>
+          <p:spPr>
+            <a:xfrm rot="5400000">
+              <a:off x="9292166" y="2379134"/>
+              <a:ext cx="2396067" cy="2099733"/>
+            </a:xfrm>
+            <a:prstGeom prst="triangle">
+              <a:avLst/>
+            </a:prstGeom>
+            <a:solidFill>
+              <a:schemeClr val="tx1"/>
+            </a:solidFill>
+            <a:ln>
+              <a:noFill/>
+            </a:ln>
+          </p:spPr>
+          <p:style>
+            <a:lnRef idx="2">
+              <a:schemeClr val="accent1">
+                <a:shade val="50000"/>
+              </a:schemeClr>
+            </a:lnRef>
+            <a:fillRef idx="1">
+              <a:schemeClr val="accent1"/>
+            </a:fillRef>
+            <a:effectRef idx="0">
+              <a:schemeClr val="accent1"/>
+            </a:effectRef>
+            <a:fontRef idx="minor">
+              <a:schemeClr val="lt1"/>
+            </a:fontRef>
+          </p:style>
+          <p:txBody>
+            <a:bodyPr rtlCol="0" anchor="ctr"/>
+            <a:lstStyle/>
+            <a:p>
+              <a:pPr algn="ctr"/>
+              <a:endParaRPr lang="en-AU"/>
+            </a:p>
+          </p:txBody>
+        </p:sp>
+        <p:sp>
+          <p:nvSpPr>
+            <p:cNvPr id="6" name="Isosceles Triangle 5">
+              <a:extLst>
+                <a:ext uri="{FF2B5EF4-FFF2-40B4-BE49-F238E27FC236}">
+                  <a16:creationId xmlns:a16="http://schemas.microsoft.com/office/drawing/2014/main" id="{50049509-024F-43EA-A614-2C31B6803B8F}"/>
+                </a:ext>
+              </a:extLst>
+            </p:cNvPr>
+            <p:cNvSpPr/>
+            <p:nvPr/>
+          </p:nvSpPr>
+          <p:spPr>
+            <a:xfrm>
+              <a:off x="2616199" y="131232"/>
+              <a:ext cx="2396067" cy="2099733"/>
+            </a:xfrm>
+            <a:prstGeom prst="triangle">
+              <a:avLst>
+                <a:gd name="adj" fmla="val 0"/>
+              </a:avLst>
+            </a:prstGeom>
+            <a:solidFill>
+              <a:schemeClr val="tx1"/>
+            </a:solidFill>
+            <a:ln>
+              <a:noFill/>
+            </a:ln>
+          </p:spPr>
+          <p:style>
+            <a:lnRef idx="2">
+              <a:schemeClr val="accent1">
+                <a:shade val="50000"/>
+              </a:schemeClr>
+            </a:lnRef>
+            <a:fillRef idx="1">
+              <a:schemeClr val="accent1"/>
+            </a:fillRef>
+            <a:effectRef idx="0">
+              <a:schemeClr val="accent1"/>
+            </a:effectRef>
+            <a:fontRef idx="minor">
+              <a:schemeClr val="lt1"/>
+            </a:fontRef>
+          </p:style>
+          <p:txBody>
+            <a:bodyPr rtlCol="0" anchor="ctr"/>
+            <a:lstStyle/>
+            <a:p>
+              <a:pPr algn="ctr"/>
+              <a:endParaRPr lang="en-AU"/>
+            </a:p>
+          </p:txBody>
+        </p:sp>
+        <p:sp>
+          <p:nvSpPr>
+            <p:cNvPr id="7" name="Isosceles Triangle 6">
+              <a:extLst>
+                <a:ext uri="{FF2B5EF4-FFF2-40B4-BE49-F238E27FC236}">
+                  <a16:creationId xmlns:a16="http://schemas.microsoft.com/office/drawing/2014/main" id="{09592E3D-F6C0-461B-8709-73F823E65EF4}"/>
+                </a:ext>
+              </a:extLst>
+            </p:cNvPr>
+            <p:cNvSpPr/>
+            <p:nvPr/>
+          </p:nvSpPr>
+          <p:spPr>
+            <a:xfrm rot="10800000">
+              <a:off x="2616200" y="4627034"/>
+              <a:ext cx="2396067" cy="2099733"/>
+            </a:xfrm>
+            <a:prstGeom prst="triangle">
+              <a:avLst>
+                <a:gd name="adj" fmla="val 100000"/>
+              </a:avLst>
+            </a:prstGeom>
+            <a:solidFill>
+              <a:schemeClr val="tx1"/>
+            </a:solidFill>
+            <a:ln>
+              <a:noFill/>
+            </a:ln>
+          </p:spPr>
+          <p:style>
+            <a:lnRef idx="2">
+              <a:schemeClr val="accent1">
+                <a:shade val="50000"/>
+              </a:schemeClr>
+            </a:lnRef>
+            <a:fillRef idx="1">
+              <a:schemeClr val="accent1"/>
+            </a:fillRef>
+            <a:effectRef idx="0">
+              <a:schemeClr val="accent1"/>
+            </a:effectRef>
+            <a:fontRef idx="minor">
+              <a:schemeClr val="lt1"/>
+            </a:fontRef>
+          </p:style>
+          <p:txBody>
+            <a:bodyPr rtlCol="0" anchor="ctr"/>
+            <a:lstStyle/>
+            <a:p>
+              <a:pPr algn="ctr"/>
+              <a:endParaRPr lang="en-AU"/>
+            </a:p>
+          </p:txBody>
+        </p:sp>
+      </p:grpSp>
     </p:spTree>
     <p:extLst>
       <p:ext uri="{BB962C8B-B14F-4D97-AF65-F5344CB8AC3E}">
@@ -4101,6 +4123,269 @@
     <p:extLst>
       <p:ext uri="{BB962C8B-B14F-4D97-AF65-F5344CB8AC3E}">
         <p14:creationId xmlns:p14="http://schemas.microsoft.com/office/powerpoint/2010/main" val="322791415"/>
+      </p:ext>
+    </p:extLst>
+  </p:cSld>
+  <p:clrMapOvr>
+    <a:masterClrMapping/>
+  </p:clrMapOvr>
+</p:sld>
+</file>
+
+<file path=ppt/slides/slide4.xml><?xml version="1.0" encoding="utf-8"?>
+<p:sld xmlns:a="http://schemas.openxmlformats.org/drawingml/2006/main" xmlns:r="http://schemas.openxmlformats.org/officeDocument/2006/relationships" xmlns:p="http://schemas.openxmlformats.org/presentationml/2006/main">
+  <p:cSld>
+    <p:spTree>
+      <p:nvGrpSpPr>
+        <p:cNvPr id="1" name=""/>
+        <p:cNvGrpSpPr/>
+        <p:nvPr/>
+      </p:nvGrpSpPr>
+      <p:grpSpPr>
+        <a:xfrm>
+          <a:off x="0" y="0"/>
+          <a:ext cx="0" cy="0"/>
+          <a:chOff x="0" y="0"/>
+          <a:chExt cx="0" cy="0"/>
+        </a:xfrm>
+      </p:grpSpPr>
+      <p:grpSp>
+        <p:nvGrpSpPr>
+          <p:cNvPr id="2" name="Group 1">
+            <a:extLst>
+              <a:ext uri="{FF2B5EF4-FFF2-40B4-BE49-F238E27FC236}">
+                <a16:creationId xmlns:a16="http://schemas.microsoft.com/office/drawing/2014/main" id="{783DE72E-87FD-4D11-9109-A1401849E685}"/>
+              </a:ext>
+            </a:extLst>
+          </p:cNvPr>
+          <p:cNvGrpSpPr/>
+          <p:nvPr/>
+        </p:nvGrpSpPr>
+        <p:grpSpPr>
+          <a:xfrm rot="5400000">
+            <a:off x="2726268" y="473075"/>
+            <a:ext cx="6263218" cy="5911851"/>
+            <a:chOff x="1354668" y="131232"/>
+            <a:chExt cx="10185398" cy="6595535"/>
+          </a:xfrm>
+        </p:grpSpPr>
+        <p:sp>
+          <p:nvSpPr>
+            <p:cNvPr id="4" name="Rectangle 3">
+              <a:extLst>
+                <a:ext uri="{FF2B5EF4-FFF2-40B4-BE49-F238E27FC236}">
+                  <a16:creationId xmlns:a16="http://schemas.microsoft.com/office/drawing/2014/main" id="{ED4C6AF5-E0CD-4909-A091-D24C7B5ADFEC}"/>
+                </a:ext>
+              </a:extLst>
+            </p:cNvPr>
+            <p:cNvSpPr/>
+            <p:nvPr/>
+          </p:nvSpPr>
+          <p:spPr>
+            <a:xfrm>
+              <a:off x="1354668" y="2230967"/>
+              <a:ext cx="7662332" cy="2396067"/>
+            </a:xfrm>
+            <a:prstGeom prst="rect">
+              <a:avLst/>
+            </a:prstGeom>
+            <a:solidFill>
+              <a:schemeClr val="tx1"/>
+            </a:solidFill>
+            <a:ln>
+              <a:noFill/>
+            </a:ln>
+          </p:spPr>
+          <p:style>
+            <a:lnRef idx="2">
+              <a:schemeClr val="accent1">
+                <a:shade val="50000"/>
+              </a:schemeClr>
+            </a:lnRef>
+            <a:fillRef idx="1">
+              <a:schemeClr val="accent1"/>
+            </a:fillRef>
+            <a:effectRef idx="0">
+              <a:schemeClr val="accent1"/>
+            </a:effectRef>
+            <a:fontRef idx="minor">
+              <a:schemeClr val="lt1"/>
+            </a:fontRef>
+          </p:style>
+          <p:txBody>
+            <a:bodyPr rtlCol="0" anchor="ctr"/>
+            <a:lstStyle/>
+            <a:p>
+              <a:pPr algn="ctr"/>
+              <a:endParaRPr lang="en-AU"/>
+            </a:p>
+          </p:txBody>
+        </p:sp>
+        <p:sp>
+          <p:nvSpPr>
+            <p:cNvPr id="5" name="Isosceles Triangle 4">
+              <a:extLst>
+                <a:ext uri="{FF2B5EF4-FFF2-40B4-BE49-F238E27FC236}">
+                  <a16:creationId xmlns:a16="http://schemas.microsoft.com/office/drawing/2014/main" id="{6DBC495A-5066-41BB-9D6B-19616BA35479}"/>
+                </a:ext>
+              </a:extLst>
+            </p:cNvPr>
+            <p:cNvSpPr/>
+            <p:nvPr/>
+          </p:nvSpPr>
+          <p:spPr>
+            <a:xfrm rot="5400000">
+              <a:off x="9292166" y="2379134"/>
+              <a:ext cx="2396067" cy="2099733"/>
+            </a:xfrm>
+            <a:prstGeom prst="triangle">
+              <a:avLst/>
+            </a:prstGeom>
+            <a:solidFill>
+              <a:schemeClr val="tx1"/>
+            </a:solidFill>
+            <a:ln>
+              <a:noFill/>
+            </a:ln>
+          </p:spPr>
+          <p:style>
+            <a:lnRef idx="2">
+              <a:schemeClr val="accent1">
+                <a:shade val="50000"/>
+              </a:schemeClr>
+            </a:lnRef>
+            <a:fillRef idx="1">
+              <a:schemeClr val="accent1"/>
+            </a:fillRef>
+            <a:effectRef idx="0">
+              <a:schemeClr val="accent1"/>
+            </a:effectRef>
+            <a:fontRef idx="minor">
+              <a:schemeClr val="lt1"/>
+            </a:fontRef>
+          </p:style>
+          <p:txBody>
+            <a:bodyPr rtlCol="0" anchor="ctr"/>
+            <a:lstStyle/>
+            <a:p>
+              <a:pPr algn="ctr"/>
+              <a:endParaRPr lang="en-AU"/>
+            </a:p>
+          </p:txBody>
+        </p:sp>
+        <p:sp>
+          <p:nvSpPr>
+            <p:cNvPr id="6" name="Isosceles Triangle 5">
+              <a:extLst>
+                <a:ext uri="{FF2B5EF4-FFF2-40B4-BE49-F238E27FC236}">
+                  <a16:creationId xmlns:a16="http://schemas.microsoft.com/office/drawing/2014/main" id="{50049509-024F-43EA-A614-2C31B6803B8F}"/>
+                </a:ext>
+              </a:extLst>
+            </p:cNvPr>
+            <p:cNvSpPr/>
+            <p:nvPr/>
+          </p:nvSpPr>
+          <p:spPr>
+            <a:xfrm>
+              <a:off x="2616199" y="131232"/>
+              <a:ext cx="2396067" cy="2099733"/>
+            </a:xfrm>
+            <a:prstGeom prst="triangle">
+              <a:avLst>
+                <a:gd name="adj" fmla="val 0"/>
+              </a:avLst>
+            </a:prstGeom>
+            <a:solidFill>
+              <a:schemeClr val="tx1"/>
+            </a:solidFill>
+            <a:ln>
+              <a:noFill/>
+            </a:ln>
+          </p:spPr>
+          <p:style>
+            <a:lnRef idx="2">
+              <a:schemeClr val="accent1">
+                <a:shade val="50000"/>
+              </a:schemeClr>
+            </a:lnRef>
+            <a:fillRef idx="1">
+              <a:schemeClr val="accent1"/>
+            </a:fillRef>
+            <a:effectRef idx="0">
+              <a:schemeClr val="accent1"/>
+            </a:effectRef>
+            <a:fontRef idx="minor">
+              <a:schemeClr val="lt1"/>
+            </a:fontRef>
+          </p:style>
+          <p:txBody>
+            <a:bodyPr rtlCol="0" anchor="ctr"/>
+            <a:lstStyle/>
+            <a:p>
+              <a:pPr algn="ctr"/>
+              <a:endParaRPr lang="en-AU"/>
+            </a:p>
+          </p:txBody>
+        </p:sp>
+        <p:sp>
+          <p:nvSpPr>
+            <p:cNvPr id="7" name="Isosceles Triangle 6">
+              <a:extLst>
+                <a:ext uri="{FF2B5EF4-FFF2-40B4-BE49-F238E27FC236}">
+                  <a16:creationId xmlns:a16="http://schemas.microsoft.com/office/drawing/2014/main" id="{09592E3D-F6C0-461B-8709-73F823E65EF4}"/>
+                </a:ext>
+              </a:extLst>
+            </p:cNvPr>
+            <p:cNvSpPr/>
+            <p:nvPr/>
+          </p:nvSpPr>
+          <p:spPr>
+            <a:xfrm rot="10800000">
+              <a:off x="2616200" y="4627034"/>
+              <a:ext cx="2396067" cy="2099733"/>
+            </a:xfrm>
+            <a:prstGeom prst="triangle">
+              <a:avLst>
+                <a:gd name="adj" fmla="val 100000"/>
+              </a:avLst>
+            </a:prstGeom>
+            <a:solidFill>
+              <a:schemeClr val="tx1"/>
+            </a:solidFill>
+            <a:ln>
+              <a:noFill/>
+            </a:ln>
+          </p:spPr>
+          <p:style>
+            <a:lnRef idx="2">
+              <a:schemeClr val="accent1">
+                <a:shade val="50000"/>
+              </a:schemeClr>
+            </a:lnRef>
+            <a:fillRef idx="1">
+              <a:schemeClr val="accent1"/>
+            </a:fillRef>
+            <a:effectRef idx="0">
+              <a:schemeClr val="accent1"/>
+            </a:effectRef>
+            <a:fontRef idx="minor">
+              <a:schemeClr val="lt1"/>
+            </a:fontRef>
+          </p:style>
+          <p:txBody>
+            <a:bodyPr rtlCol="0" anchor="ctr"/>
+            <a:lstStyle/>
+            <a:p>
+              <a:pPr algn="ctr"/>
+              <a:endParaRPr lang="en-AU"/>
+            </a:p>
+          </p:txBody>
+        </p:sp>
+      </p:grpSp>
+    </p:spTree>
+    <p:extLst>
+      <p:ext uri="{BB962C8B-B14F-4D97-AF65-F5344CB8AC3E}">
+        <p14:creationId xmlns:p14="http://schemas.microsoft.com/office/powerpoint/2010/main" val="2420475174"/>
       </p:ext>
     </p:extLst>
   </p:cSld>

</xml_diff>

<commit_message>
New icons with white glow, for visibility over dark screen (night-time). Starting to add debug stuff for the unexploded bomb issue. Added flickering light damage, so players can see damage at night (smoke is hard to see). Moved Player CanvasLayer into Viewport: fixes issue of HUD for each player. Added CSG Mesh as new terrain - should fix terrain collision issue.
</commit_message>
<xml_diff>
--- a/assets/Icons/icons.pptx
+++ b/assets/Icons/icons.pptx
@@ -7,7 +7,7 @@
   <p:sldIdLst>
     <p:sldId id="256" r:id="rId2"/>
     <p:sldId id="257" r:id="rId3"/>
-    <p:sldId id="258" r:id="rId4"/>
+    <p:sldId id="260" r:id="rId4"/>
     <p:sldId id="259" r:id="rId5"/>
   </p:sldIdLst>
   <p:sldSz cx="12192000" cy="6858000"/>
@@ -264,7 +264,7 @@
           <a:p>
             <a:fld id="{83B0DD9A-6AEE-4CA7-A9F6-A1A12CF444F7}" type="datetimeFigureOut">
               <a:rPr lang="en-AU" smtClean="0"/>
-              <a:t>9/01/2022</a:t>
+              <a:t>13/01/2022</a:t>
             </a:fld>
             <a:endParaRPr lang="en-AU"/>
           </a:p>
@@ -464,7 +464,7 @@
           <a:p>
             <a:fld id="{83B0DD9A-6AEE-4CA7-A9F6-A1A12CF444F7}" type="datetimeFigureOut">
               <a:rPr lang="en-AU" smtClean="0"/>
-              <a:t>9/01/2022</a:t>
+              <a:t>13/01/2022</a:t>
             </a:fld>
             <a:endParaRPr lang="en-AU"/>
           </a:p>
@@ -674,7 +674,7 @@
           <a:p>
             <a:fld id="{83B0DD9A-6AEE-4CA7-A9F6-A1A12CF444F7}" type="datetimeFigureOut">
               <a:rPr lang="en-AU" smtClean="0"/>
-              <a:t>9/01/2022</a:t>
+              <a:t>13/01/2022</a:t>
             </a:fld>
             <a:endParaRPr lang="en-AU"/>
           </a:p>
@@ -874,7 +874,7 @@
           <a:p>
             <a:fld id="{83B0DD9A-6AEE-4CA7-A9F6-A1A12CF444F7}" type="datetimeFigureOut">
               <a:rPr lang="en-AU" smtClean="0"/>
-              <a:t>9/01/2022</a:t>
+              <a:t>13/01/2022</a:t>
             </a:fld>
             <a:endParaRPr lang="en-AU"/>
           </a:p>
@@ -1150,7 +1150,7 @@
           <a:p>
             <a:fld id="{83B0DD9A-6AEE-4CA7-A9F6-A1A12CF444F7}" type="datetimeFigureOut">
               <a:rPr lang="en-AU" smtClean="0"/>
-              <a:t>9/01/2022</a:t>
+              <a:t>13/01/2022</a:t>
             </a:fld>
             <a:endParaRPr lang="en-AU"/>
           </a:p>
@@ -1418,7 +1418,7 @@
           <a:p>
             <a:fld id="{83B0DD9A-6AEE-4CA7-A9F6-A1A12CF444F7}" type="datetimeFigureOut">
               <a:rPr lang="en-AU" smtClean="0"/>
-              <a:t>9/01/2022</a:t>
+              <a:t>13/01/2022</a:t>
             </a:fld>
             <a:endParaRPr lang="en-AU"/>
           </a:p>
@@ -1833,7 +1833,7 @@
           <a:p>
             <a:fld id="{83B0DD9A-6AEE-4CA7-A9F6-A1A12CF444F7}" type="datetimeFigureOut">
               <a:rPr lang="en-AU" smtClean="0"/>
-              <a:t>9/01/2022</a:t>
+              <a:t>13/01/2022</a:t>
             </a:fld>
             <a:endParaRPr lang="en-AU"/>
           </a:p>
@@ -1975,7 +1975,7 @@
           <a:p>
             <a:fld id="{83B0DD9A-6AEE-4CA7-A9F6-A1A12CF444F7}" type="datetimeFigureOut">
               <a:rPr lang="en-AU" smtClean="0"/>
-              <a:t>9/01/2022</a:t>
+              <a:t>13/01/2022</a:t>
             </a:fld>
             <a:endParaRPr lang="en-AU"/>
           </a:p>
@@ -2088,7 +2088,7 @@
           <a:p>
             <a:fld id="{83B0DD9A-6AEE-4CA7-A9F6-A1A12CF444F7}" type="datetimeFigureOut">
               <a:rPr lang="en-AU" smtClean="0"/>
-              <a:t>9/01/2022</a:t>
+              <a:t>13/01/2022</a:t>
             </a:fld>
             <a:endParaRPr lang="en-AU"/>
           </a:p>
@@ -2401,7 +2401,7 @@
           <a:p>
             <a:fld id="{83B0DD9A-6AEE-4CA7-A9F6-A1A12CF444F7}" type="datetimeFigureOut">
               <a:rPr lang="en-AU" smtClean="0"/>
-              <a:t>9/01/2022</a:t>
+              <a:t>13/01/2022</a:t>
             </a:fld>
             <a:endParaRPr lang="en-AU"/>
           </a:p>
@@ -2690,7 +2690,7 @@
           <a:p>
             <a:fld id="{83B0DD9A-6AEE-4CA7-A9F6-A1A12CF444F7}" type="datetimeFigureOut">
               <a:rPr lang="en-AU" smtClean="0"/>
-              <a:t>9/01/2022</a:t>
+              <a:t>13/01/2022</a:t>
             </a:fld>
             <a:endParaRPr lang="en-AU"/>
           </a:p>
@@ -2933,7 +2933,7 @@
           <a:p>
             <a:fld id="{83B0DD9A-6AEE-4CA7-A9F6-A1A12CF444F7}" type="datetimeFigureOut">
               <a:rPr lang="en-AU" smtClean="0"/>
-              <a:t>9/01/2022</a:t>
+              <a:t>13/01/2022</a:t>
             </a:fld>
             <a:endParaRPr lang="en-AU"/>
           </a:p>
@@ -3352,10 +3352,10 @@
       </p:grpSpPr>
       <p:grpSp>
         <p:nvGrpSpPr>
-          <p:cNvPr id="2" name="Group 1">
-            <a:extLst>
-              <a:ext uri="{FF2B5EF4-FFF2-40B4-BE49-F238E27FC236}">
-                <a16:creationId xmlns:a16="http://schemas.microsoft.com/office/drawing/2014/main" id="{783DE72E-87FD-4D11-9109-A1401849E685}"/>
+          <p:cNvPr id="39" name="Group 38">
+            <a:extLst>
+              <a:ext uri="{FF2B5EF4-FFF2-40B4-BE49-F238E27FC236}">
+                <a16:creationId xmlns:a16="http://schemas.microsoft.com/office/drawing/2014/main" id="{4F4DD76A-382E-46D9-A840-1AA73730AA44}"/>
               </a:ext>
             </a:extLst>
           </p:cNvPr>
@@ -3369,6 +3369,11 @@
             <a:chOff x="1354668" y="131232"/>
             <a:chExt cx="10185398" cy="6595535"/>
           </a:xfrm>
+          <a:effectLst>
+            <a:glow rad="635000">
+              <a:schemeClr val="bg1"/>
+            </a:glow>
+          </a:effectLst>
         </p:grpSpPr>
         <p:sp>
           <p:nvSpPr>
@@ -3613,270 +3618,296 @@
           <a:chExt cx="0" cy="0"/>
         </a:xfrm>
       </p:grpSpPr>
-      <p:sp>
-        <p:nvSpPr>
-          <p:cNvPr id="4" name="Rectangle 3">
-            <a:extLst>
-              <a:ext uri="{FF2B5EF4-FFF2-40B4-BE49-F238E27FC236}">
-                <a16:creationId xmlns:a16="http://schemas.microsoft.com/office/drawing/2014/main" id="{ED4C6AF5-E0CD-4909-A091-D24C7B5ADFEC}"/>
-              </a:ext>
-            </a:extLst>
-          </p:cNvPr>
-          <p:cNvSpPr/>
+      <p:grpSp>
+        <p:nvGrpSpPr>
+          <p:cNvPr id="28" name="Group 27">
+            <a:extLst>
+              <a:ext uri="{FF2B5EF4-FFF2-40B4-BE49-F238E27FC236}">
+                <a16:creationId xmlns:a16="http://schemas.microsoft.com/office/drawing/2014/main" id="{A0E9FC7A-7162-47C7-95B0-765C1D25AC26}"/>
+              </a:ext>
+            </a:extLst>
+          </p:cNvPr>
+          <p:cNvGrpSpPr/>
           <p:nvPr/>
-        </p:nvSpPr>
-        <p:spPr>
+        </p:nvGrpSpPr>
+        <p:grpSpPr>
           <a:xfrm>
-            <a:off x="4292600" y="2230966"/>
-            <a:ext cx="4902199" cy="2396067"/>
+            <a:off x="436032" y="2230966"/>
+            <a:ext cx="11319935" cy="2396067"/>
+            <a:chOff x="397931" y="2230966"/>
+            <a:chExt cx="11319935" cy="2396067"/>
           </a:xfrm>
-          <a:prstGeom prst="rect">
-            <a:avLst/>
-          </a:prstGeom>
-          <a:solidFill>
-            <a:schemeClr val="tx1"/>
-          </a:solidFill>
-          <a:ln>
-            <a:noFill/>
-          </a:ln>
-        </p:spPr>
-        <p:style>
-          <a:lnRef idx="2">
-            <a:schemeClr val="accent1">
-              <a:shade val="50000"/>
-            </a:schemeClr>
-          </a:lnRef>
-          <a:fillRef idx="1">
-            <a:schemeClr val="accent1"/>
-          </a:fillRef>
-          <a:effectRef idx="0">
-            <a:schemeClr val="accent1"/>
-          </a:effectRef>
-          <a:fontRef idx="minor">
-            <a:schemeClr val="lt1"/>
-          </a:fontRef>
-        </p:style>
-        <p:txBody>
-          <a:bodyPr rtlCol="0" anchor="ctr"/>
-          <a:lstStyle/>
-          <a:p>
-            <a:pPr algn="ctr"/>
-            <a:endParaRPr lang="en-AU"/>
-          </a:p>
-        </p:txBody>
-      </p:sp>
-      <p:sp>
-        <p:nvSpPr>
-          <p:cNvPr id="5" name="Isosceles Triangle 4">
-            <a:extLst>
-              <a:ext uri="{FF2B5EF4-FFF2-40B4-BE49-F238E27FC236}">
-                <a16:creationId xmlns:a16="http://schemas.microsoft.com/office/drawing/2014/main" id="{6DBC495A-5066-41BB-9D6B-19616BA35479}"/>
-              </a:ext>
-            </a:extLst>
-          </p:cNvPr>
-          <p:cNvSpPr/>
-          <p:nvPr/>
-        </p:nvSpPr>
-        <p:spPr>
-          <a:xfrm rot="5400000">
-            <a:off x="9469966" y="2379133"/>
-            <a:ext cx="2396067" cy="2099733"/>
-          </a:xfrm>
-          <a:prstGeom prst="triangle">
-            <a:avLst/>
-          </a:prstGeom>
-          <a:solidFill>
-            <a:schemeClr val="tx1"/>
-          </a:solidFill>
-          <a:ln>
-            <a:noFill/>
-          </a:ln>
-        </p:spPr>
-        <p:style>
-          <a:lnRef idx="2">
-            <a:schemeClr val="accent1">
-              <a:shade val="50000"/>
-            </a:schemeClr>
-          </a:lnRef>
-          <a:fillRef idx="1">
-            <a:schemeClr val="accent1"/>
-          </a:fillRef>
-          <a:effectRef idx="0">
-            <a:schemeClr val="accent1"/>
-          </a:effectRef>
-          <a:fontRef idx="minor">
-            <a:schemeClr val="lt1"/>
-          </a:fontRef>
-        </p:style>
-        <p:txBody>
-          <a:bodyPr rtlCol="0" anchor="ctr"/>
-          <a:lstStyle/>
-          <a:p>
-            <a:pPr algn="ctr"/>
-            <a:endParaRPr lang="en-AU"/>
-          </a:p>
-        </p:txBody>
-      </p:sp>
-      <p:sp>
-        <p:nvSpPr>
-          <p:cNvPr id="6" name="Isosceles Triangle 5">
-            <a:extLst>
-              <a:ext uri="{FF2B5EF4-FFF2-40B4-BE49-F238E27FC236}">
-                <a16:creationId xmlns:a16="http://schemas.microsoft.com/office/drawing/2014/main" id="{50049509-024F-43EA-A614-2C31B6803B8F}"/>
-              </a:ext>
-            </a:extLst>
-          </p:cNvPr>
-          <p:cNvSpPr/>
-          <p:nvPr/>
-        </p:nvSpPr>
-        <p:spPr>
-          <a:xfrm>
-            <a:off x="397932" y="2230966"/>
-            <a:ext cx="3894668" cy="850900"/>
-          </a:xfrm>
-          <a:prstGeom prst="triangle">
-            <a:avLst>
-              <a:gd name="adj" fmla="val 100000"/>
-            </a:avLst>
-          </a:prstGeom>
-          <a:solidFill>
-            <a:schemeClr val="tx1"/>
-          </a:solidFill>
-          <a:ln>
-            <a:noFill/>
-          </a:ln>
-        </p:spPr>
-        <p:style>
-          <a:lnRef idx="2">
-            <a:schemeClr val="accent1">
-              <a:shade val="50000"/>
-            </a:schemeClr>
-          </a:lnRef>
-          <a:fillRef idx="1">
-            <a:schemeClr val="accent1"/>
-          </a:fillRef>
-          <a:effectRef idx="0">
-            <a:schemeClr val="accent1"/>
-          </a:effectRef>
-          <a:fontRef idx="minor">
-            <a:schemeClr val="lt1"/>
-          </a:fontRef>
-        </p:style>
-        <p:txBody>
-          <a:bodyPr rtlCol="0" anchor="ctr"/>
-          <a:lstStyle/>
-          <a:p>
-            <a:pPr algn="ctr"/>
-            <a:endParaRPr lang="en-AU"/>
-          </a:p>
-        </p:txBody>
-      </p:sp>
-      <p:sp>
-        <p:nvSpPr>
-          <p:cNvPr id="7" name="Isosceles Triangle 6">
-            <a:extLst>
-              <a:ext uri="{FF2B5EF4-FFF2-40B4-BE49-F238E27FC236}">
-                <a16:creationId xmlns:a16="http://schemas.microsoft.com/office/drawing/2014/main" id="{09592E3D-F6C0-461B-8709-73F823E65EF4}"/>
-              </a:ext>
-            </a:extLst>
-          </p:cNvPr>
-          <p:cNvSpPr/>
-          <p:nvPr/>
-        </p:nvSpPr>
-        <p:spPr>
-          <a:xfrm rot="10800000">
-            <a:off x="397931" y="3776133"/>
-            <a:ext cx="3894667" cy="850900"/>
-          </a:xfrm>
-          <a:prstGeom prst="triangle">
-            <a:avLst>
-              <a:gd name="adj" fmla="val 0"/>
-            </a:avLst>
-          </a:prstGeom>
-          <a:solidFill>
-            <a:schemeClr val="tx1"/>
-          </a:solidFill>
-          <a:ln>
-            <a:noFill/>
-          </a:ln>
-        </p:spPr>
-        <p:style>
-          <a:lnRef idx="2">
-            <a:schemeClr val="accent1">
-              <a:shade val="50000"/>
-            </a:schemeClr>
-          </a:lnRef>
-          <a:fillRef idx="1">
-            <a:schemeClr val="accent1"/>
-          </a:fillRef>
-          <a:effectRef idx="0">
-            <a:schemeClr val="accent1"/>
-          </a:effectRef>
-          <a:fontRef idx="minor">
-            <a:schemeClr val="lt1"/>
-          </a:fontRef>
-        </p:style>
-        <p:txBody>
-          <a:bodyPr rtlCol="0" anchor="ctr"/>
-          <a:lstStyle/>
-          <a:p>
-            <a:pPr algn="ctr"/>
-            <a:endParaRPr lang="en-AU"/>
-          </a:p>
-        </p:txBody>
-      </p:sp>
-      <p:sp>
-        <p:nvSpPr>
-          <p:cNvPr id="8" name="Rectangle 7">
-            <a:extLst>
-              <a:ext uri="{FF2B5EF4-FFF2-40B4-BE49-F238E27FC236}">
-                <a16:creationId xmlns:a16="http://schemas.microsoft.com/office/drawing/2014/main" id="{47599C1F-F823-4CBD-AF79-4197526A6003}"/>
-              </a:ext>
-            </a:extLst>
-          </p:cNvPr>
-          <p:cNvSpPr/>
-          <p:nvPr/>
-        </p:nvSpPr>
-        <p:spPr>
-          <a:xfrm>
-            <a:off x="397932" y="3081866"/>
-            <a:ext cx="3894666" cy="694267"/>
-          </a:xfrm>
-          <a:prstGeom prst="rect">
-            <a:avLst/>
-          </a:prstGeom>
-          <a:solidFill>
-            <a:schemeClr val="tx1"/>
-          </a:solidFill>
-          <a:ln>
-            <a:noFill/>
-          </a:ln>
-        </p:spPr>
-        <p:style>
-          <a:lnRef idx="2">
-            <a:schemeClr val="accent1">
-              <a:shade val="50000"/>
-            </a:schemeClr>
-          </a:lnRef>
-          <a:fillRef idx="1">
-            <a:schemeClr val="accent1"/>
-          </a:fillRef>
-          <a:effectRef idx="0">
-            <a:schemeClr val="accent1"/>
-          </a:effectRef>
-          <a:fontRef idx="minor">
-            <a:schemeClr val="lt1"/>
-          </a:fontRef>
-        </p:style>
-        <p:txBody>
-          <a:bodyPr rtlCol="0" anchor="ctr"/>
-          <a:lstStyle/>
-          <a:p>
-            <a:pPr algn="ctr"/>
-            <a:endParaRPr lang="en-AU"/>
-          </a:p>
-        </p:txBody>
-      </p:sp>
+          <a:effectLst>
+            <a:glow rad="635000">
+              <a:schemeClr val="bg1"/>
+            </a:glow>
+          </a:effectLst>
+        </p:grpSpPr>
+        <p:sp>
+          <p:nvSpPr>
+            <p:cNvPr id="4" name="Rectangle 3">
+              <a:extLst>
+                <a:ext uri="{FF2B5EF4-FFF2-40B4-BE49-F238E27FC236}">
+                  <a16:creationId xmlns:a16="http://schemas.microsoft.com/office/drawing/2014/main" id="{ED4C6AF5-E0CD-4909-A091-D24C7B5ADFEC}"/>
+                </a:ext>
+              </a:extLst>
+            </p:cNvPr>
+            <p:cNvSpPr/>
+            <p:nvPr/>
+          </p:nvSpPr>
+          <p:spPr>
+            <a:xfrm>
+              <a:off x="4292600" y="2230966"/>
+              <a:ext cx="4902199" cy="2396067"/>
+            </a:xfrm>
+            <a:prstGeom prst="rect">
+              <a:avLst/>
+            </a:prstGeom>
+            <a:solidFill>
+              <a:schemeClr val="tx1"/>
+            </a:solidFill>
+            <a:ln>
+              <a:noFill/>
+            </a:ln>
+          </p:spPr>
+          <p:style>
+            <a:lnRef idx="2">
+              <a:schemeClr val="accent1">
+                <a:shade val="50000"/>
+              </a:schemeClr>
+            </a:lnRef>
+            <a:fillRef idx="1">
+              <a:schemeClr val="accent1"/>
+            </a:fillRef>
+            <a:effectRef idx="0">
+              <a:schemeClr val="accent1"/>
+            </a:effectRef>
+            <a:fontRef idx="minor">
+              <a:schemeClr val="lt1"/>
+            </a:fontRef>
+          </p:style>
+          <p:txBody>
+            <a:bodyPr rtlCol="0" anchor="ctr"/>
+            <a:lstStyle/>
+            <a:p>
+              <a:pPr algn="ctr"/>
+              <a:endParaRPr lang="en-AU"/>
+            </a:p>
+          </p:txBody>
+        </p:sp>
+        <p:sp>
+          <p:nvSpPr>
+            <p:cNvPr id="5" name="Isosceles Triangle 4">
+              <a:extLst>
+                <a:ext uri="{FF2B5EF4-FFF2-40B4-BE49-F238E27FC236}">
+                  <a16:creationId xmlns:a16="http://schemas.microsoft.com/office/drawing/2014/main" id="{6DBC495A-5066-41BB-9D6B-19616BA35479}"/>
+                </a:ext>
+              </a:extLst>
+            </p:cNvPr>
+            <p:cNvSpPr/>
+            <p:nvPr/>
+          </p:nvSpPr>
+          <p:spPr>
+            <a:xfrm rot="5400000">
+              <a:off x="9469966" y="2379133"/>
+              <a:ext cx="2396067" cy="2099733"/>
+            </a:xfrm>
+            <a:prstGeom prst="triangle">
+              <a:avLst/>
+            </a:prstGeom>
+            <a:solidFill>
+              <a:schemeClr val="tx1"/>
+            </a:solidFill>
+            <a:ln>
+              <a:noFill/>
+            </a:ln>
+          </p:spPr>
+          <p:style>
+            <a:lnRef idx="2">
+              <a:schemeClr val="accent1">
+                <a:shade val="50000"/>
+              </a:schemeClr>
+            </a:lnRef>
+            <a:fillRef idx="1">
+              <a:schemeClr val="accent1"/>
+            </a:fillRef>
+            <a:effectRef idx="0">
+              <a:schemeClr val="accent1"/>
+            </a:effectRef>
+            <a:fontRef idx="minor">
+              <a:schemeClr val="lt1"/>
+            </a:fontRef>
+          </p:style>
+          <p:txBody>
+            <a:bodyPr rtlCol="0" anchor="ctr"/>
+            <a:lstStyle/>
+            <a:p>
+              <a:pPr algn="ctr"/>
+              <a:endParaRPr lang="en-AU"/>
+            </a:p>
+          </p:txBody>
+        </p:sp>
+        <p:sp>
+          <p:nvSpPr>
+            <p:cNvPr id="6" name="Isosceles Triangle 5">
+              <a:extLst>
+                <a:ext uri="{FF2B5EF4-FFF2-40B4-BE49-F238E27FC236}">
+                  <a16:creationId xmlns:a16="http://schemas.microsoft.com/office/drawing/2014/main" id="{50049509-024F-43EA-A614-2C31B6803B8F}"/>
+                </a:ext>
+              </a:extLst>
+            </p:cNvPr>
+            <p:cNvSpPr/>
+            <p:nvPr/>
+          </p:nvSpPr>
+          <p:spPr>
+            <a:xfrm>
+              <a:off x="397932" y="2230966"/>
+              <a:ext cx="3894668" cy="850900"/>
+            </a:xfrm>
+            <a:prstGeom prst="triangle">
+              <a:avLst>
+                <a:gd name="adj" fmla="val 100000"/>
+              </a:avLst>
+            </a:prstGeom>
+            <a:solidFill>
+              <a:schemeClr val="tx1"/>
+            </a:solidFill>
+            <a:ln>
+              <a:noFill/>
+            </a:ln>
+          </p:spPr>
+          <p:style>
+            <a:lnRef idx="2">
+              <a:schemeClr val="accent1">
+                <a:shade val="50000"/>
+              </a:schemeClr>
+            </a:lnRef>
+            <a:fillRef idx="1">
+              <a:schemeClr val="accent1"/>
+            </a:fillRef>
+            <a:effectRef idx="0">
+              <a:schemeClr val="accent1"/>
+            </a:effectRef>
+            <a:fontRef idx="minor">
+              <a:schemeClr val="lt1"/>
+            </a:fontRef>
+          </p:style>
+          <p:txBody>
+            <a:bodyPr rtlCol="0" anchor="ctr"/>
+            <a:lstStyle/>
+            <a:p>
+              <a:pPr algn="ctr"/>
+              <a:endParaRPr lang="en-AU"/>
+            </a:p>
+          </p:txBody>
+        </p:sp>
+        <p:sp>
+          <p:nvSpPr>
+            <p:cNvPr id="7" name="Isosceles Triangle 6">
+              <a:extLst>
+                <a:ext uri="{FF2B5EF4-FFF2-40B4-BE49-F238E27FC236}">
+                  <a16:creationId xmlns:a16="http://schemas.microsoft.com/office/drawing/2014/main" id="{09592E3D-F6C0-461B-8709-73F823E65EF4}"/>
+                </a:ext>
+              </a:extLst>
+            </p:cNvPr>
+            <p:cNvSpPr/>
+            <p:nvPr/>
+          </p:nvSpPr>
+          <p:spPr>
+            <a:xfrm rot="10800000">
+              <a:off x="397931" y="3776133"/>
+              <a:ext cx="3894667" cy="850900"/>
+            </a:xfrm>
+            <a:prstGeom prst="triangle">
+              <a:avLst>
+                <a:gd name="adj" fmla="val 0"/>
+              </a:avLst>
+            </a:prstGeom>
+            <a:solidFill>
+              <a:schemeClr val="tx1"/>
+            </a:solidFill>
+            <a:ln>
+              <a:noFill/>
+            </a:ln>
+          </p:spPr>
+          <p:style>
+            <a:lnRef idx="2">
+              <a:schemeClr val="accent1">
+                <a:shade val="50000"/>
+              </a:schemeClr>
+            </a:lnRef>
+            <a:fillRef idx="1">
+              <a:schemeClr val="accent1"/>
+            </a:fillRef>
+            <a:effectRef idx="0">
+              <a:schemeClr val="accent1"/>
+            </a:effectRef>
+            <a:fontRef idx="minor">
+              <a:schemeClr val="lt1"/>
+            </a:fontRef>
+          </p:style>
+          <p:txBody>
+            <a:bodyPr rtlCol="0" anchor="ctr"/>
+            <a:lstStyle/>
+            <a:p>
+              <a:pPr algn="ctr"/>
+              <a:endParaRPr lang="en-AU"/>
+            </a:p>
+          </p:txBody>
+        </p:sp>
+        <p:sp>
+          <p:nvSpPr>
+            <p:cNvPr id="8" name="Rectangle 7">
+              <a:extLst>
+                <a:ext uri="{FF2B5EF4-FFF2-40B4-BE49-F238E27FC236}">
+                  <a16:creationId xmlns:a16="http://schemas.microsoft.com/office/drawing/2014/main" id="{47599C1F-F823-4CBD-AF79-4197526A6003}"/>
+                </a:ext>
+              </a:extLst>
+            </p:cNvPr>
+            <p:cNvSpPr/>
+            <p:nvPr/>
+          </p:nvSpPr>
+          <p:spPr>
+            <a:xfrm>
+              <a:off x="397932" y="3081866"/>
+              <a:ext cx="3894666" cy="694267"/>
+            </a:xfrm>
+            <a:prstGeom prst="rect">
+              <a:avLst/>
+            </a:prstGeom>
+            <a:solidFill>
+              <a:schemeClr val="tx1"/>
+            </a:solidFill>
+            <a:ln>
+              <a:noFill/>
+            </a:ln>
+          </p:spPr>
+          <p:style>
+            <a:lnRef idx="2">
+              <a:schemeClr val="accent1">
+                <a:shade val="50000"/>
+              </a:schemeClr>
+            </a:lnRef>
+            <a:fillRef idx="1">
+              <a:schemeClr val="accent1"/>
+            </a:fillRef>
+            <a:effectRef idx="0">
+              <a:schemeClr val="accent1"/>
+            </a:effectRef>
+            <a:fontRef idx="minor">
+              <a:schemeClr val="lt1"/>
+            </a:fontRef>
+          </p:style>
+          <p:txBody>
+            <a:bodyPr rtlCol="0" anchor="ctr"/>
+            <a:lstStyle/>
+            <a:p>
+              <a:pPr algn="ctr"/>
+              <a:endParaRPr lang="en-AU"/>
+            </a:p>
+          </p:txBody>
+        </p:sp>
+      </p:grpSp>
     </p:spTree>
     <p:extLst>
       <p:ext uri="{BB962C8B-B14F-4D97-AF65-F5344CB8AC3E}">
@@ -3907,222 +3938,248 @@
           <a:chExt cx="0" cy="0"/>
         </a:xfrm>
       </p:grpSpPr>
-      <p:sp>
-        <p:nvSpPr>
-          <p:cNvPr id="4" name="Rectangle 3">
-            <a:extLst>
-              <a:ext uri="{FF2B5EF4-FFF2-40B4-BE49-F238E27FC236}">
-                <a16:creationId xmlns:a16="http://schemas.microsoft.com/office/drawing/2014/main" id="{ED4C6AF5-E0CD-4909-A091-D24C7B5ADFEC}"/>
-              </a:ext>
-            </a:extLst>
-          </p:cNvPr>
-          <p:cNvSpPr/>
+      <p:grpSp>
+        <p:nvGrpSpPr>
+          <p:cNvPr id="3" name="Group 2">
+            <a:extLst>
+              <a:ext uri="{FF2B5EF4-FFF2-40B4-BE49-F238E27FC236}">
+                <a16:creationId xmlns:a16="http://schemas.microsoft.com/office/drawing/2014/main" id="{6F3E6258-4EA0-4ECA-AC76-1D78BFEEBC7B}"/>
+              </a:ext>
+            </a:extLst>
+          </p:cNvPr>
+          <p:cNvGrpSpPr/>
           <p:nvPr/>
-        </p:nvSpPr>
-        <p:spPr>
+        </p:nvGrpSpPr>
+        <p:grpSpPr>
           <a:xfrm>
-            <a:off x="2616199" y="2518834"/>
-            <a:ext cx="6400799" cy="2396067"/>
+            <a:off x="2616199" y="1411816"/>
+            <a:ext cx="6400799" cy="3503085"/>
+            <a:chOff x="2616199" y="1411816"/>
+            <a:chExt cx="6400799" cy="3503085"/>
           </a:xfrm>
-          <a:prstGeom prst="rect">
-            <a:avLst/>
-          </a:prstGeom>
-          <a:solidFill>
-            <a:schemeClr val="tx1"/>
-          </a:solidFill>
-          <a:ln>
-            <a:noFill/>
-          </a:ln>
-        </p:spPr>
-        <p:style>
-          <a:lnRef idx="2">
-            <a:schemeClr val="accent1">
-              <a:shade val="50000"/>
-            </a:schemeClr>
-          </a:lnRef>
-          <a:fillRef idx="1">
-            <a:schemeClr val="accent1"/>
-          </a:fillRef>
-          <a:effectRef idx="0">
-            <a:schemeClr val="accent1"/>
-          </a:effectRef>
-          <a:fontRef idx="minor">
-            <a:schemeClr val="lt1"/>
-          </a:fontRef>
-        </p:style>
-        <p:txBody>
-          <a:bodyPr rtlCol="0" anchor="ctr"/>
-          <a:lstStyle/>
-          <a:p>
-            <a:pPr algn="ctr"/>
-            <a:endParaRPr lang="en-AU"/>
-          </a:p>
-        </p:txBody>
-      </p:sp>
-      <p:sp>
-        <p:nvSpPr>
-          <p:cNvPr id="6" name="Isosceles Triangle 5">
-            <a:extLst>
-              <a:ext uri="{FF2B5EF4-FFF2-40B4-BE49-F238E27FC236}">
-                <a16:creationId xmlns:a16="http://schemas.microsoft.com/office/drawing/2014/main" id="{50049509-024F-43EA-A614-2C31B6803B8F}"/>
-              </a:ext>
-            </a:extLst>
-          </p:cNvPr>
-          <p:cNvSpPr/>
-          <p:nvPr/>
-        </p:nvSpPr>
-        <p:spPr>
-          <a:xfrm>
-            <a:off x="3060441" y="1411816"/>
-            <a:ext cx="1951825" cy="819151"/>
-          </a:xfrm>
-          <a:prstGeom prst="triangle">
-            <a:avLst>
-              <a:gd name="adj" fmla="val 100000"/>
-            </a:avLst>
-          </a:prstGeom>
-          <a:solidFill>
-            <a:schemeClr val="tx1"/>
-          </a:solidFill>
-          <a:ln>
-            <a:noFill/>
-          </a:ln>
-        </p:spPr>
-        <p:style>
-          <a:lnRef idx="2">
-            <a:schemeClr val="accent1">
-              <a:shade val="50000"/>
-            </a:schemeClr>
-          </a:lnRef>
-          <a:fillRef idx="1">
-            <a:schemeClr val="accent1"/>
-          </a:fillRef>
-          <a:effectRef idx="0">
-            <a:schemeClr val="accent1"/>
-          </a:effectRef>
-          <a:fontRef idx="minor">
-            <a:schemeClr val="lt1"/>
-          </a:fontRef>
-        </p:style>
-        <p:txBody>
-          <a:bodyPr rtlCol="0" anchor="ctr"/>
-          <a:lstStyle/>
-          <a:p>
-            <a:pPr algn="ctr"/>
-            <a:endParaRPr lang="en-AU"/>
-          </a:p>
-        </p:txBody>
-      </p:sp>
-      <p:sp>
-        <p:nvSpPr>
-          <p:cNvPr id="7" name="Isosceles Triangle 6">
-            <a:extLst>
-              <a:ext uri="{FF2B5EF4-FFF2-40B4-BE49-F238E27FC236}">
-                <a16:creationId xmlns:a16="http://schemas.microsoft.com/office/drawing/2014/main" id="{09592E3D-F6C0-461B-8709-73F823E65EF4}"/>
-              </a:ext>
-            </a:extLst>
-          </p:cNvPr>
-          <p:cNvSpPr/>
-          <p:nvPr/>
-        </p:nvSpPr>
-        <p:spPr>
-          <a:xfrm rot="10800000" flipH="1" flipV="1">
-            <a:off x="6620932" y="1411816"/>
-            <a:ext cx="2075199" cy="819151"/>
-          </a:xfrm>
-          <a:prstGeom prst="triangle">
-            <a:avLst>
-              <a:gd name="adj" fmla="val 0"/>
-            </a:avLst>
-          </a:prstGeom>
-          <a:solidFill>
-            <a:schemeClr val="tx1"/>
-          </a:solidFill>
-          <a:ln>
-            <a:noFill/>
-          </a:ln>
-        </p:spPr>
-        <p:style>
-          <a:lnRef idx="2">
-            <a:schemeClr val="accent1">
-              <a:shade val="50000"/>
-            </a:schemeClr>
-          </a:lnRef>
-          <a:fillRef idx="1">
-            <a:schemeClr val="accent1"/>
-          </a:fillRef>
-          <a:effectRef idx="0">
-            <a:schemeClr val="accent1"/>
-          </a:effectRef>
-          <a:fontRef idx="minor">
-            <a:schemeClr val="lt1"/>
-          </a:fontRef>
-        </p:style>
-        <p:txBody>
-          <a:bodyPr rtlCol="0" anchor="ctr"/>
-          <a:lstStyle/>
-          <a:p>
-            <a:pPr algn="ctr"/>
-            <a:endParaRPr lang="en-AU"/>
-          </a:p>
-        </p:txBody>
-      </p:sp>
-      <p:sp>
-        <p:nvSpPr>
-          <p:cNvPr id="8" name="Rectangle 7">
-            <a:extLst>
-              <a:ext uri="{FF2B5EF4-FFF2-40B4-BE49-F238E27FC236}">
-                <a16:creationId xmlns:a16="http://schemas.microsoft.com/office/drawing/2014/main" id="{47599C1F-F823-4CBD-AF79-4197526A6003}"/>
-              </a:ext>
-            </a:extLst>
-          </p:cNvPr>
-          <p:cNvSpPr/>
-          <p:nvPr/>
-        </p:nvSpPr>
-        <p:spPr>
-          <a:xfrm>
-            <a:off x="5012267" y="1411816"/>
-            <a:ext cx="1608666" cy="819151"/>
-          </a:xfrm>
-          <a:prstGeom prst="rect">
-            <a:avLst/>
-          </a:prstGeom>
-          <a:solidFill>
-            <a:schemeClr val="tx1"/>
-          </a:solidFill>
-          <a:ln>
-            <a:noFill/>
-          </a:ln>
-        </p:spPr>
-        <p:style>
-          <a:lnRef idx="2">
-            <a:schemeClr val="accent1">
-              <a:shade val="50000"/>
-            </a:schemeClr>
-          </a:lnRef>
-          <a:fillRef idx="1">
-            <a:schemeClr val="accent1"/>
-          </a:fillRef>
-          <a:effectRef idx="0">
-            <a:schemeClr val="accent1"/>
-          </a:effectRef>
-          <a:fontRef idx="minor">
-            <a:schemeClr val="lt1"/>
-          </a:fontRef>
-        </p:style>
-        <p:txBody>
-          <a:bodyPr rtlCol="0" anchor="ctr"/>
-          <a:lstStyle/>
-          <a:p>
-            <a:pPr algn="ctr"/>
-            <a:endParaRPr lang="en-AU"/>
-          </a:p>
-        </p:txBody>
-      </p:sp>
+          <a:effectLst>
+            <a:glow rad="635000">
+              <a:schemeClr val="bg1"/>
+            </a:glow>
+          </a:effectLst>
+        </p:grpSpPr>
+        <p:sp>
+          <p:nvSpPr>
+            <p:cNvPr id="4" name="Rectangle 3">
+              <a:extLst>
+                <a:ext uri="{FF2B5EF4-FFF2-40B4-BE49-F238E27FC236}">
+                  <a16:creationId xmlns:a16="http://schemas.microsoft.com/office/drawing/2014/main" id="{ED4C6AF5-E0CD-4909-A091-D24C7B5ADFEC}"/>
+                </a:ext>
+              </a:extLst>
+            </p:cNvPr>
+            <p:cNvSpPr/>
+            <p:nvPr/>
+          </p:nvSpPr>
+          <p:spPr>
+            <a:xfrm>
+              <a:off x="2616199" y="2540000"/>
+              <a:ext cx="6400799" cy="2374901"/>
+            </a:xfrm>
+            <a:prstGeom prst="rect">
+              <a:avLst/>
+            </a:prstGeom>
+            <a:solidFill>
+              <a:schemeClr val="tx1"/>
+            </a:solidFill>
+            <a:ln>
+              <a:noFill/>
+            </a:ln>
+          </p:spPr>
+          <p:style>
+            <a:lnRef idx="2">
+              <a:schemeClr val="accent1">
+                <a:shade val="50000"/>
+              </a:schemeClr>
+            </a:lnRef>
+            <a:fillRef idx="1">
+              <a:schemeClr val="accent1"/>
+            </a:fillRef>
+            <a:effectRef idx="0">
+              <a:schemeClr val="accent1"/>
+            </a:effectRef>
+            <a:fontRef idx="minor">
+              <a:schemeClr val="lt1"/>
+            </a:fontRef>
+          </p:style>
+          <p:txBody>
+            <a:bodyPr rtlCol="0" anchor="ctr"/>
+            <a:lstStyle/>
+            <a:p>
+              <a:pPr algn="ctr"/>
+              <a:endParaRPr lang="en-AU"/>
+            </a:p>
+          </p:txBody>
+        </p:sp>
+        <p:sp>
+          <p:nvSpPr>
+            <p:cNvPr id="6" name="Isosceles Triangle 5">
+              <a:extLst>
+                <a:ext uri="{FF2B5EF4-FFF2-40B4-BE49-F238E27FC236}">
+                  <a16:creationId xmlns:a16="http://schemas.microsoft.com/office/drawing/2014/main" id="{50049509-024F-43EA-A614-2C31B6803B8F}"/>
+                </a:ext>
+              </a:extLst>
+            </p:cNvPr>
+            <p:cNvSpPr/>
+            <p:nvPr/>
+          </p:nvSpPr>
+          <p:spPr>
+            <a:xfrm>
+              <a:off x="2616199" y="1411816"/>
+              <a:ext cx="2396067" cy="804911"/>
+            </a:xfrm>
+            <a:prstGeom prst="triangle">
+              <a:avLst>
+                <a:gd name="adj" fmla="val 100000"/>
+              </a:avLst>
+            </a:prstGeom>
+            <a:solidFill>
+              <a:schemeClr val="tx1"/>
+            </a:solidFill>
+            <a:ln>
+              <a:noFill/>
+            </a:ln>
+          </p:spPr>
+          <p:style>
+            <a:lnRef idx="2">
+              <a:schemeClr val="accent1">
+                <a:shade val="50000"/>
+              </a:schemeClr>
+            </a:lnRef>
+            <a:fillRef idx="1">
+              <a:schemeClr val="accent1"/>
+            </a:fillRef>
+            <a:effectRef idx="0">
+              <a:schemeClr val="accent1"/>
+            </a:effectRef>
+            <a:fontRef idx="minor">
+              <a:schemeClr val="lt1"/>
+            </a:fontRef>
+          </p:style>
+          <p:txBody>
+            <a:bodyPr rtlCol="0" anchor="ctr"/>
+            <a:lstStyle/>
+            <a:p>
+              <a:pPr algn="ctr"/>
+              <a:endParaRPr lang="en-AU"/>
+            </a:p>
+          </p:txBody>
+        </p:sp>
+        <p:sp>
+          <p:nvSpPr>
+            <p:cNvPr id="7" name="Isosceles Triangle 6">
+              <a:extLst>
+                <a:ext uri="{FF2B5EF4-FFF2-40B4-BE49-F238E27FC236}">
+                  <a16:creationId xmlns:a16="http://schemas.microsoft.com/office/drawing/2014/main" id="{09592E3D-F6C0-461B-8709-73F823E65EF4}"/>
+                </a:ext>
+              </a:extLst>
+            </p:cNvPr>
+            <p:cNvSpPr/>
+            <p:nvPr/>
+          </p:nvSpPr>
+          <p:spPr>
+            <a:xfrm rot="10800000" flipH="1" flipV="1">
+              <a:off x="6620932" y="1411816"/>
+              <a:ext cx="2396066" cy="804911"/>
+            </a:xfrm>
+            <a:prstGeom prst="triangle">
+              <a:avLst>
+                <a:gd name="adj" fmla="val 0"/>
+              </a:avLst>
+            </a:prstGeom>
+            <a:solidFill>
+              <a:schemeClr val="tx1"/>
+            </a:solidFill>
+            <a:ln>
+              <a:noFill/>
+            </a:ln>
+          </p:spPr>
+          <p:style>
+            <a:lnRef idx="2">
+              <a:schemeClr val="accent1">
+                <a:shade val="50000"/>
+              </a:schemeClr>
+            </a:lnRef>
+            <a:fillRef idx="1">
+              <a:schemeClr val="accent1"/>
+            </a:fillRef>
+            <a:effectRef idx="0">
+              <a:schemeClr val="accent1"/>
+            </a:effectRef>
+            <a:fontRef idx="minor">
+              <a:schemeClr val="lt1"/>
+            </a:fontRef>
+          </p:style>
+          <p:txBody>
+            <a:bodyPr rtlCol="0" anchor="ctr"/>
+            <a:lstStyle/>
+            <a:p>
+              <a:pPr algn="ctr"/>
+              <a:endParaRPr lang="en-AU"/>
+            </a:p>
+          </p:txBody>
+        </p:sp>
+        <p:sp>
+          <p:nvSpPr>
+            <p:cNvPr id="8" name="Rectangle 7">
+              <a:extLst>
+                <a:ext uri="{FF2B5EF4-FFF2-40B4-BE49-F238E27FC236}">
+                  <a16:creationId xmlns:a16="http://schemas.microsoft.com/office/drawing/2014/main" id="{47599C1F-F823-4CBD-AF79-4197526A6003}"/>
+                </a:ext>
+              </a:extLst>
+            </p:cNvPr>
+            <p:cNvSpPr/>
+            <p:nvPr/>
+          </p:nvSpPr>
+          <p:spPr>
+            <a:xfrm>
+              <a:off x="5012267" y="1411816"/>
+              <a:ext cx="1608666" cy="804911"/>
+            </a:xfrm>
+            <a:prstGeom prst="rect">
+              <a:avLst/>
+            </a:prstGeom>
+            <a:solidFill>
+              <a:schemeClr val="tx1"/>
+            </a:solidFill>
+            <a:ln>
+              <a:noFill/>
+            </a:ln>
+          </p:spPr>
+          <p:style>
+            <a:lnRef idx="2">
+              <a:schemeClr val="accent1">
+                <a:shade val="50000"/>
+              </a:schemeClr>
+            </a:lnRef>
+            <a:fillRef idx="1">
+              <a:schemeClr val="accent1"/>
+            </a:fillRef>
+            <a:effectRef idx="0">
+              <a:schemeClr val="accent1"/>
+            </a:effectRef>
+            <a:fontRef idx="minor">
+              <a:schemeClr val="lt1"/>
+            </a:fontRef>
+          </p:style>
+          <p:txBody>
+            <a:bodyPr rtlCol="0" anchor="ctr"/>
+            <a:lstStyle/>
+            <a:p>
+              <a:pPr algn="ctr"/>
+              <a:endParaRPr lang="en-AU"/>
+            </a:p>
+          </p:txBody>
+        </p:sp>
+      </p:grpSp>
     </p:spTree>
     <p:extLst>
       <p:ext uri="{BB962C8B-B14F-4D97-AF65-F5344CB8AC3E}">
-        <p14:creationId xmlns:p14="http://schemas.microsoft.com/office/powerpoint/2010/main" val="322791415"/>
+        <p14:creationId xmlns:p14="http://schemas.microsoft.com/office/powerpoint/2010/main" val="575736358"/>
       </p:ext>
     </p:extLst>
   </p:cSld>
@@ -4163,11 +4220,16 @@
         </p:nvGrpSpPr>
         <p:grpSpPr>
           <a:xfrm rot="5400000">
-            <a:off x="2726268" y="473075"/>
+            <a:off x="2726268" y="473076"/>
             <a:ext cx="6263218" cy="5911851"/>
             <a:chOff x="1354668" y="131232"/>
             <a:chExt cx="10185398" cy="6595535"/>
           </a:xfrm>
+          <a:effectLst>
+            <a:glow rad="635000">
+              <a:schemeClr val="bg1"/>
+            </a:glow>
+          </a:effectLst>
         </p:grpSpPr>
         <p:sp>
           <p:nvSpPr>

</xml_diff>